<commit_message>
Added references to related work
</commit_message>
<xml_diff>
--- a/Fundamentals of Requirements Engineering.pptx
+++ b/Fundamentals of Requirements Engineering.pptx
@@ -5,7 +5,7 @@
     <p:sldMasterId id="2147483648" r:id="rId4"/>
   </p:sldMasterIdLst>
   <p:notesMasterIdLst>
-    <p:notesMasterId r:id="rId48"/>
+    <p:notesMasterId r:id="rId49"/>
   </p:notesMasterIdLst>
   <p:sldIdLst>
     <p:sldId id="263" r:id="rId5"/>
@@ -50,7 +50,8 @@
     <p:sldId id="296" r:id="rId44"/>
     <p:sldId id="297" r:id="rId45"/>
     <p:sldId id="306" r:id="rId46"/>
-    <p:sldId id="262" r:id="rId47"/>
+    <p:sldId id="307" r:id="rId47"/>
+    <p:sldId id="262" r:id="rId48"/>
   </p:sldIdLst>
   <p:sldSz cx="12192000" cy="6858000"/>
   <p:notesSz cx="6797675" cy="9926638"/>
@@ -255,7 +256,7 @@
           <a:p>
             <a:fld id="{336E1794-CEB5-CF46-A2EB-139DCCF7D8DD}" type="datetimeFigureOut">
               <a:rPr lang="sv-SE" smtClean="0"/>
-              <a:t>2024-01-22</a:t>
+              <a:t>2024-01-25</a:t>
             </a:fld>
             <a:endParaRPr lang="sv-SE"/>
           </a:p>
@@ -4825,7 +4826,7 @@
           <a:p>
             <a:fld id="{3B7BCF5A-D38D-4049-9557-6AA9CF8E75C7}" type="datetime1">
               <a:rPr lang="en-US" smtClean="0"/>
-              <a:t>1/22/2024</a:t>
+              <a:t>1/25/2024</a:t>
             </a:fld>
             <a:endParaRPr lang="en-US"/>
           </a:p>
@@ -5157,7 +5158,7 @@
           <a:p>
             <a:fld id="{6E36FCD1-EF0D-414A-8715-FDA5010CE504}" type="datetime1">
               <a:rPr lang="en-US" smtClean="0"/>
-              <a:t>1/22/2024</a:t>
+              <a:t>1/25/2024</a:t>
             </a:fld>
             <a:endParaRPr lang="en-US"/>
           </a:p>
@@ -5852,7 +5853,7 @@
           <a:p>
             <a:fld id="{80B9E07B-40FB-4821-8D5C-500F175202FC}" type="datetime1">
               <a:rPr lang="en-US" smtClean="0"/>
-              <a:t>1/22/2024</a:t>
+              <a:t>1/25/2024</a:t>
             </a:fld>
             <a:endParaRPr lang="en-US"/>
           </a:p>
@@ -6462,7 +6463,7 @@
           <a:p>
             <a:fld id="{6E36FCD1-EF0D-414A-8715-FDA5010CE504}" type="datetime1">
               <a:rPr lang="en-US" smtClean="0"/>
-              <a:t>1/22/2024</a:t>
+              <a:t>1/25/2024</a:t>
             </a:fld>
             <a:endParaRPr lang="en-US"/>
           </a:p>
@@ -8011,6 +8012,41 @@
           </p:txBody>
         </p:sp>
       </p:grpSp>
+      <p:sp>
+        <p:nvSpPr>
+          <p:cNvPr id="3" name="TextBox 2">
+            <a:extLst>
+              <a:ext uri="{FF2B5EF4-FFF2-40B4-BE49-F238E27FC236}">
+                <a16:creationId xmlns:a16="http://schemas.microsoft.com/office/drawing/2014/main" id="{F326F1F6-2473-CC75-F086-56CD0EE83DE4}"/>
+              </a:ext>
+            </a:extLst>
+          </p:cNvPr>
+          <p:cNvSpPr txBox="1"/>
+          <p:nvPr/>
+        </p:nvSpPr>
+        <p:spPr>
+          <a:xfrm>
+            <a:off x="838199" y="6110129"/>
+            <a:ext cx="1067513" cy="246221"/>
+          </a:xfrm>
+          <a:prstGeom prst="rect">
+            <a:avLst/>
+          </a:prstGeom>
+          <a:noFill/>
+        </p:spPr>
+        <p:txBody>
+          <a:bodyPr wrap="square" rtlCol="0">
+            <a:spAutoFit/>
+          </a:bodyPr>
+          <a:lstStyle/>
+          <a:p>
+            <a:r>
+              <a:rPr lang="en-US" sz="1000" dirty="0"/>
+              <a:t>Based on [3]</a:t>
+            </a:r>
+          </a:p>
+        </p:txBody>
+      </p:sp>
     </p:spTree>
     <p:extLst>
       <p:ext uri="{BB962C8B-B14F-4D97-AF65-F5344CB8AC3E}">
@@ -8388,7 +8424,7 @@
           <a:p>
             <a:fld id="{BD078EC0-A51C-4C3E-9829-78AAFE391D51}" type="datetime1">
               <a:rPr lang="en-US" smtClean="0"/>
-              <a:t>1/22/2024</a:t>
+              <a:t>1/25/2024</a:t>
             </a:fld>
             <a:endParaRPr lang="en-US"/>
           </a:p>
@@ -8559,7 +8595,7 @@
           <a:p>
             <a:fld id="{739CC0AE-49AA-4879-9517-8926B38034B9}" type="datetime1">
               <a:rPr lang="en-US" smtClean="0"/>
-              <a:t>1/22/2024</a:t>
+              <a:t>1/25/2024</a:t>
             </a:fld>
             <a:endParaRPr lang="en-US"/>
           </a:p>
@@ -9383,6 +9419,41 @@
                 </a:solidFill>
               </a:rPr>
               <a:t>Product</a:t>
+            </a:r>
+          </a:p>
+        </p:txBody>
+      </p:sp>
+      <p:sp>
+        <p:nvSpPr>
+          <p:cNvPr id="5" name="TextBox 4">
+            <a:extLst>
+              <a:ext uri="{FF2B5EF4-FFF2-40B4-BE49-F238E27FC236}">
+                <a16:creationId xmlns:a16="http://schemas.microsoft.com/office/drawing/2014/main" id="{817F96BC-9F18-4900-A1B4-59F5294D0D3F}"/>
+              </a:ext>
+            </a:extLst>
+          </p:cNvPr>
+          <p:cNvSpPr txBox="1"/>
+          <p:nvPr/>
+        </p:nvSpPr>
+        <p:spPr>
+          <a:xfrm>
+            <a:off x="838199" y="6110129"/>
+            <a:ext cx="4682383" cy="246221"/>
+          </a:xfrm>
+          <a:prstGeom prst="rect">
+            <a:avLst/>
+          </a:prstGeom>
+          <a:noFill/>
+        </p:spPr>
+        <p:txBody>
+          <a:bodyPr wrap="square" rtlCol="0">
+            <a:spAutoFit/>
+          </a:bodyPr>
+          <a:lstStyle/>
+          <a:p>
+            <a:r>
+              <a:rPr lang="en-US" sz="1000" dirty="0"/>
+              <a:t>Based on [4] and [5]</a:t>
             </a:r>
           </a:p>
         </p:txBody>
@@ -9793,7 +9864,7 @@
           <a:p>
             <a:fld id="{AEBB3FB9-0D54-407E-B752-DC7430D34524}" type="datetime1">
               <a:rPr lang="en-US" smtClean="0"/>
-              <a:t>1/22/2024</a:t>
+              <a:t>1/25/2024</a:t>
             </a:fld>
             <a:endParaRPr lang="en-US"/>
           </a:p>
@@ -10258,7 +10329,7 @@
           <a:p>
             <a:fld id="{DAB34046-9F4D-45D4-849B-6BB3751B4048}" type="datetime1">
               <a:rPr lang="en-US" smtClean="0"/>
-              <a:t>1/22/2024</a:t>
+              <a:t>1/25/2024</a:t>
             </a:fld>
             <a:endParaRPr lang="en-US"/>
           </a:p>
@@ -15354,7 +15425,7 @@
           <a:p>
             <a:fld id="{BC3CE808-14D6-47C5-9169-3CC9C5BE1B3B}" type="datetime1">
               <a:rPr lang="en-US" smtClean="0"/>
-              <a:t>1/22/2024</a:t>
+              <a:t>1/25/2024</a:t>
             </a:fld>
             <a:endParaRPr lang="en-US"/>
           </a:p>
@@ -16331,7 +16402,7 @@
           <a:p>
             <a:fld id="{194325E1-76E4-4C4A-BD0A-6F456ECCB3A3}" type="datetime1">
               <a:rPr lang="en-US" smtClean="0"/>
-              <a:t>1/22/2024</a:t>
+              <a:t>1/25/2024</a:t>
             </a:fld>
             <a:endParaRPr lang="en-US"/>
           </a:p>
@@ -16618,7 +16689,7 @@
           <a:p>
             <a:fld id="{F18D6CCB-B4D9-4A02-AC8E-FD4F13D68814}" type="datetime1">
               <a:rPr lang="en-US" smtClean="0"/>
-              <a:t>1/22/2024</a:t>
+              <a:t>1/25/2024</a:t>
             </a:fld>
             <a:endParaRPr lang="en-US"/>
           </a:p>
@@ -16650,6 +16721,41 @@
               <a:t>17</a:t>
             </a:fld>
             <a:endParaRPr lang="en-US"/>
+          </a:p>
+        </p:txBody>
+      </p:sp>
+      <p:sp>
+        <p:nvSpPr>
+          <p:cNvPr id="6" name="TextBox 5">
+            <a:extLst>
+              <a:ext uri="{FF2B5EF4-FFF2-40B4-BE49-F238E27FC236}">
+                <a16:creationId xmlns:a16="http://schemas.microsoft.com/office/drawing/2014/main" id="{B3FB4A1A-9BDC-E58F-3AD5-C314C72D17C9}"/>
+              </a:ext>
+            </a:extLst>
+          </p:cNvPr>
+          <p:cNvSpPr txBox="1"/>
+          <p:nvPr/>
+        </p:nvSpPr>
+        <p:spPr>
+          <a:xfrm>
+            <a:off x="838199" y="6110129"/>
+            <a:ext cx="4682383" cy="246221"/>
+          </a:xfrm>
+          <a:prstGeom prst="rect">
+            <a:avLst/>
+          </a:prstGeom>
+          <a:noFill/>
+        </p:spPr>
+        <p:txBody>
+          <a:bodyPr wrap="square" rtlCol="0">
+            <a:spAutoFit/>
+          </a:bodyPr>
+          <a:lstStyle/>
+          <a:p>
+            <a:r>
+              <a:rPr lang="en-US" sz="1000" dirty="0"/>
+              <a:t>Based on [3]</a:t>
+            </a:r>
           </a:p>
         </p:txBody>
       </p:sp>
@@ -16788,7 +16894,7 @@
           <a:p>
             <a:fld id="{D2B28EAA-41E9-4250-8345-01AD4BA1DE28}" type="datetime1">
               <a:rPr lang="en-US" smtClean="0"/>
-              <a:t>1/22/2024</a:t>
+              <a:t>1/25/2024</a:t>
             </a:fld>
             <a:endParaRPr lang="en-US" dirty="0"/>
           </a:p>
@@ -18125,7 +18231,7 @@
           <a:p>
             <a:fld id="{27D7182A-5EC5-47D2-BD20-E23229C04BC8}" type="datetime1">
               <a:rPr lang="en-US" smtClean="0"/>
-              <a:t>1/22/2024</a:t>
+              <a:t>1/25/2024</a:t>
             </a:fld>
             <a:endParaRPr lang="en-US"/>
           </a:p>
@@ -18880,7 +18986,7 @@
           <a:p>
             <a:fld id="{EC39669E-38CE-4B95-B689-0983CF9C75D1}" type="datetime1">
               <a:rPr lang="en-US" smtClean="0"/>
-              <a:t>1/22/2024</a:t>
+              <a:t>1/25/2024</a:t>
             </a:fld>
             <a:endParaRPr lang="en-US"/>
           </a:p>
@@ -19587,7 +19693,7 @@
           <a:p>
             <a:fld id="{19572C42-6622-4699-98FA-4FFEF1220C36}" type="datetime1">
               <a:rPr lang="en-US" smtClean="0"/>
-              <a:t>1/22/2024</a:t>
+              <a:t>1/25/2024</a:t>
             </a:fld>
             <a:endParaRPr lang="en-US"/>
           </a:p>
@@ -20222,7 +20328,7 @@
           <a:p>
             <a:fld id="{CE037427-DD9D-4016-A7FE-D436AA4F5615}" type="datetime1">
               <a:rPr lang="en-US" smtClean="0"/>
-              <a:t>1/22/2024</a:t>
+              <a:t>1/25/2024</a:t>
             </a:fld>
             <a:endParaRPr lang="en-US"/>
           </a:p>
@@ -22541,7 +22647,7 @@
           <a:p>
             <a:fld id="{B230F6EB-DB7A-4831-9514-284E4EB17710}" type="datetime1">
               <a:rPr lang="en-US" smtClean="0"/>
-              <a:t>1/22/2024</a:t>
+              <a:t>1/25/2024</a:t>
             </a:fld>
             <a:endParaRPr lang="en-US"/>
           </a:p>
@@ -23142,7 +23248,7 @@
           <a:p>
             <a:fld id="{43C7FD7D-468C-4D3D-B1B7-992F0D3C65E8}" type="datetime1">
               <a:rPr lang="en-US" smtClean="0"/>
-              <a:t>1/22/2024</a:t>
+              <a:t>1/25/2024</a:t>
             </a:fld>
             <a:endParaRPr lang="en-US"/>
           </a:p>
@@ -24906,7 +25012,7 @@
           <a:p>
             <a:fld id="{7584C097-60D7-40DB-9237-446E0F27F5B7}" type="datetime1">
               <a:rPr lang="en-US" smtClean="0"/>
-              <a:t>1/22/2024</a:t>
+              <a:t>1/25/2024</a:t>
             </a:fld>
             <a:endParaRPr lang="en-US"/>
           </a:p>
@@ -25542,7 +25648,7 @@
           <a:p>
             <a:fld id="{08A12AD3-E929-496A-9B6D-40A23E79453E}" type="datetime1">
               <a:rPr lang="en-US" smtClean="0"/>
-              <a:t>1/22/2024</a:t>
+              <a:t>1/25/2024</a:t>
             </a:fld>
             <a:endParaRPr lang="en-US"/>
           </a:p>
@@ -26387,7 +26493,7 @@
           <a:p>
             <a:fld id="{2693A42E-ACE0-49F7-87F8-53E9ADE1DBEF}" type="datetime1">
               <a:rPr lang="en-US" smtClean="0"/>
-              <a:t>1/22/2024</a:t>
+              <a:t>1/25/2024</a:t>
             </a:fld>
             <a:endParaRPr lang="en-US"/>
           </a:p>
@@ -28460,7 +28566,7 @@
           <a:p>
             <a:fld id="{94DA7F0C-7133-448D-8063-85F99F0323B5}" type="datetime1">
               <a:rPr lang="en-US" smtClean="0"/>
-              <a:t>1/22/2024</a:t>
+              <a:t>1/25/2024</a:t>
             </a:fld>
             <a:endParaRPr lang="en-US"/>
           </a:p>
@@ -29106,7 +29212,7 @@
           <a:p>
             <a:fld id="{6E36FCD1-EF0D-414A-8715-FDA5010CE504}" type="datetime1">
               <a:rPr lang="en-US" smtClean="0"/>
-              <a:t>1/22/2024</a:t>
+              <a:t>1/25/2024</a:t>
             </a:fld>
             <a:endParaRPr lang="en-US"/>
           </a:p>
@@ -30912,7 +31018,7 @@
           <a:p>
             <a:fld id="{6E36FCD1-EF0D-414A-8715-FDA5010CE504}" type="datetime1">
               <a:rPr lang="en-US" smtClean="0"/>
-              <a:t>1/22/2024</a:t>
+              <a:t>1/25/2024</a:t>
             </a:fld>
             <a:endParaRPr lang="en-US"/>
           </a:p>
@@ -32014,7 +32120,7 @@
           <a:p>
             <a:fld id="{2802D718-6DE2-4AB8-8BEF-0BA3BF78C223}" type="datetime1">
               <a:rPr lang="en-US" smtClean="0"/>
-              <a:t>1/22/2024</a:t>
+              <a:t>1/25/2024</a:t>
             </a:fld>
             <a:endParaRPr lang="en-US"/>
           </a:p>
@@ -33071,7 +33177,7 @@
           <a:p>
             <a:fld id="{B57DC635-5142-4F9E-9DA2-85BB90320592}" type="datetime1">
               <a:rPr lang="en-US" smtClean="0"/>
-              <a:t>1/22/2024</a:t>
+              <a:t>1/25/2024</a:t>
             </a:fld>
             <a:endParaRPr lang="en-US"/>
           </a:p>
@@ -33806,7 +33912,7 @@
           <a:p>
             <a:fld id="{B33610E4-2961-45C7-A776-E07BB3ED3887}" type="datetime1">
               <a:rPr lang="en-US" smtClean="0"/>
-              <a:t>1/22/2024</a:t>
+              <a:t>1/25/2024</a:t>
             </a:fld>
             <a:endParaRPr lang="en-US"/>
           </a:p>
@@ -34456,7 +34562,7 @@
           <a:p>
             <a:fld id="{4A55C532-E8C5-478E-8913-6D8C04653C64}" type="datetime1">
               <a:rPr lang="en-US" smtClean="0"/>
-              <a:t>1/22/2024</a:t>
+              <a:t>1/25/2024</a:t>
             </a:fld>
             <a:endParaRPr lang="en-US"/>
           </a:p>
@@ -35659,7 +35765,7 @@
           <a:p>
             <a:fld id="{6E36FCD1-EF0D-414A-8715-FDA5010CE504}" type="datetime1">
               <a:rPr lang="en-US" smtClean="0"/>
-              <a:t>1/22/2024</a:t>
+              <a:t>1/25/2024</a:t>
             </a:fld>
             <a:endParaRPr lang="en-US"/>
           </a:p>
@@ -37315,7 +37421,7 @@
           <a:p>
             <a:fld id="{6E36FCD1-EF0D-414A-8715-FDA5010CE504}" type="datetime1">
               <a:rPr lang="en-US" smtClean="0"/>
-              <a:t>1/22/2024</a:t>
+              <a:t>1/25/2024</a:t>
             </a:fld>
             <a:endParaRPr lang="en-US"/>
           </a:p>
@@ -38866,7 +38972,7 @@
           <a:p>
             <a:fld id="{480F521C-1BDD-4F41-B18F-56CE2CFCE833}" type="datetime1">
               <a:rPr lang="en-US" smtClean="0"/>
-              <a:t>1/22/2024</a:t>
+              <a:t>1/25/2024</a:t>
             </a:fld>
             <a:endParaRPr lang="en-US"/>
           </a:p>
@@ -39584,7 +39690,7 @@
           <a:p>
             <a:fld id="{56FE5323-CD37-487F-874C-D9EE8E40D6B0}" type="datetime1">
               <a:rPr lang="en-US" smtClean="0"/>
-              <a:t>1/22/2024</a:t>
+              <a:t>1/25/2024</a:t>
             </a:fld>
             <a:endParaRPr lang="en-US"/>
           </a:p>
@@ -40738,7 +40844,7 @@
           <a:p>
             <a:fld id="{85525264-39EE-459F-AC4B-1AFBE94A2F01}" type="datetime1">
               <a:rPr lang="en-US" smtClean="0"/>
-              <a:t>1/22/2024</a:t>
+              <a:t>1/25/2024</a:t>
             </a:fld>
             <a:endParaRPr lang="en-US"/>
           </a:p>
@@ -42300,7 +42406,7 @@
           <a:p>
             <a:fld id="{8E57CF68-86CF-4B04-97AA-53F674411AD0}" type="datetime1">
               <a:rPr lang="en-US" smtClean="0"/>
-              <a:t>1/22/2024</a:t>
+              <a:t>1/25/2024</a:t>
             </a:fld>
             <a:endParaRPr lang="en-US"/>
           </a:p>
@@ -45750,7 +45856,7 @@
           <a:p>
             <a:fld id="{293BA648-6739-483F-8A6B-AAD93F3C3B83}" type="datetime1">
               <a:rPr lang="en-US" smtClean="0"/>
-              <a:t>1/22/2024</a:t>
+              <a:t>1/25/2024</a:t>
             </a:fld>
             <a:endParaRPr lang="en-US"/>
           </a:p>
@@ -45980,7 +46086,7 @@
           <a:p>
             <a:fld id="{709AF2CB-EB7C-46D3-9328-CE51B325712D}" type="datetime1">
               <a:rPr lang="en-US" smtClean="0"/>
-              <a:t>1/22/2024</a:t>
+              <a:t>1/25/2024</a:t>
             </a:fld>
             <a:endParaRPr lang="en-US"/>
           </a:p>
@@ -46108,7 +46214,7 @@
           <a:p>
             <a:fld id="{BD642525-0261-41A6-9D87-F5BFAD554544}" type="datetime1">
               <a:rPr lang="en-US" smtClean="0"/>
-              <a:t>1/22/2024</a:t>
+              <a:t>1/25/2024</a:t>
             </a:fld>
             <a:endParaRPr lang="en-US"/>
           </a:p>
@@ -47337,7 +47443,7 @@
           <a:p>
             <a:fld id="{7FCD7330-91D7-4176-ABD0-FCC1BC192AA9}" type="datetime1">
               <a:rPr lang="en-US" smtClean="0"/>
-              <a:t>1/22/2024</a:t>
+              <a:t>1/25/2024</a:t>
             </a:fld>
             <a:endParaRPr lang="en-US"/>
           </a:p>
@@ -48172,7 +48278,7 @@
           <a:p>
             <a:r>
               <a:rPr lang="en-US" dirty="0"/>
-              <a:t>Further reading</a:t>
+              <a:t>Recommended reading</a:t>
             </a:r>
           </a:p>
         </p:txBody>
@@ -48277,7 +48383,7 @@
           <a:p>
             <a:fld id="{6E36FCD1-EF0D-414A-8715-FDA5010CE504}" type="datetime1">
               <a:rPr lang="en-US" smtClean="0"/>
-              <a:t>1/22/2024</a:t>
+              <a:t>1/25/2024</a:t>
             </a:fld>
             <a:endParaRPr lang="en-US"/>
           </a:p>
@@ -48727,6 +48833,331 @@
           <a:chExt cx="0" cy="0"/>
         </a:xfrm>
       </p:grpSpPr>
+      <p:sp>
+        <p:nvSpPr>
+          <p:cNvPr id="2" name="Title 1">
+            <a:extLst>
+              <a:ext uri="{FF2B5EF4-FFF2-40B4-BE49-F238E27FC236}">
+                <a16:creationId xmlns:a16="http://schemas.microsoft.com/office/drawing/2014/main" id="{C1D0C1C9-D88D-04DB-DA92-00FD010F0BFE}"/>
+              </a:ext>
+            </a:extLst>
+          </p:cNvPr>
+          <p:cNvSpPr>
+            <a:spLocks noGrp="1"/>
+          </p:cNvSpPr>
+          <p:nvPr>
+            <p:ph type="title"/>
+          </p:nvPr>
+        </p:nvSpPr>
+        <p:spPr/>
+        <p:txBody>
+          <a:bodyPr/>
+          <a:lstStyle/>
+          <a:p>
+            <a:r>
+              <a:rPr lang="en-US" dirty="0"/>
+              <a:t>References</a:t>
+            </a:r>
+          </a:p>
+        </p:txBody>
+      </p:sp>
+      <p:sp>
+        <p:nvSpPr>
+          <p:cNvPr id="3" name="Content Placeholder 2">
+            <a:extLst>
+              <a:ext uri="{FF2B5EF4-FFF2-40B4-BE49-F238E27FC236}">
+                <a16:creationId xmlns:a16="http://schemas.microsoft.com/office/drawing/2014/main" id="{CF5A05E1-0AB7-D3C7-9975-61BC5C32EE16}"/>
+              </a:ext>
+            </a:extLst>
+          </p:cNvPr>
+          <p:cNvSpPr>
+            <a:spLocks noGrp="1"/>
+          </p:cNvSpPr>
+          <p:nvPr>
+            <p:ph idx="1"/>
+          </p:nvPr>
+        </p:nvSpPr>
+        <p:spPr/>
+        <p:txBody>
+          <a:bodyPr>
+            <a:normAutofit fontScale="70000" lnSpcReduction="20000"/>
+          </a:bodyPr>
+          <a:lstStyle/>
+          <a:p>
+            <a:r>
+              <a:rPr lang="sv-SE" dirty="0"/>
+              <a:t>[1] </a:t>
+            </a:r>
+            <a:r>
+              <a:rPr lang="en-US" dirty="0" err="1"/>
+              <a:t>Glinz</a:t>
+            </a:r>
+            <a:r>
+              <a:rPr lang="en-US" dirty="0"/>
+              <a:t>, M. (2011). A glossary of requirements engineering terminology. </a:t>
+            </a:r>
+            <a:r>
+              <a:rPr lang="en-US" i="1" dirty="0"/>
+              <a:t>Standard Glossary of the Certified Professional for Requirements Engineering (CPRE) Studies and Exam, Version</a:t>
+            </a:r>
+            <a:r>
+              <a:rPr lang="en-US" dirty="0"/>
+              <a:t>, </a:t>
+            </a:r>
+            <a:r>
+              <a:rPr lang="en-US" i="1" dirty="0"/>
+              <a:t>1</a:t>
+            </a:r>
+            <a:r>
+              <a:rPr lang="en-US" dirty="0"/>
+              <a:t>, 56.</a:t>
+            </a:r>
+          </a:p>
+          <a:p>
+            <a:r>
+              <a:rPr lang="en-US" dirty="0"/>
+              <a:t>[2] Méndez Fernández, D., </a:t>
+            </a:r>
+            <a:r>
+              <a:rPr lang="en-US" dirty="0" err="1"/>
+              <a:t>Böhm</a:t>
+            </a:r>
+            <a:r>
+              <a:rPr lang="en-US" dirty="0"/>
+              <a:t>, W., Vogelsang, A., </a:t>
+            </a:r>
+            <a:r>
+              <a:rPr lang="en-US" dirty="0" err="1"/>
+              <a:t>Mund</a:t>
+            </a:r>
+            <a:r>
+              <a:rPr lang="en-US" dirty="0"/>
+              <a:t>, J., </a:t>
+            </a:r>
+            <a:r>
+              <a:rPr lang="en-US" dirty="0" err="1"/>
+              <a:t>Broy</a:t>
+            </a:r>
+            <a:r>
+              <a:rPr lang="en-US" dirty="0"/>
+              <a:t>, M., </a:t>
+            </a:r>
+            <a:r>
+              <a:rPr lang="en-US" dirty="0" err="1"/>
+              <a:t>Kuhrmann</a:t>
+            </a:r>
+            <a:r>
+              <a:rPr lang="en-US" dirty="0"/>
+              <a:t>, M., &amp; </a:t>
+            </a:r>
+            <a:r>
+              <a:rPr lang="en-US" dirty="0" err="1"/>
+              <a:t>Weyer</a:t>
+            </a:r>
+            <a:r>
+              <a:rPr lang="en-US" dirty="0"/>
+              <a:t>, T. (2019). Artefacts in software engineering: a fundamental positioning. </a:t>
+            </a:r>
+            <a:r>
+              <a:rPr lang="en-US" i="1" dirty="0"/>
+              <a:t>Software &amp; Systems Modeling</a:t>
+            </a:r>
+            <a:r>
+              <a:rPr lang="en-US" dirty="0"/>
+              <a:t>, </a:t>
+            </a:r>
+            <a:r>
+              <a:rPr lang="en-US" i="1" dirty="0"/>
+              <a:t>18</a:t>
+            </a:r>
+            <a:r>
+              <a:rPr lang="en-US" dirty="0"/>
+              <a:t>, 2777-2786.</a:t>
+            </a:r>
+          </a:p>
+          <a:p>
+            <a:r>
+              <a:rPr lang="en-US" dirty="0"/>
+              <a:t>[3] Méndez Fernández, D., &amp; </a:t>
+            </a:r>
+            <a:r>
+              <a:rPr lang="en-US" dirty="0" err="1"/>
+              <a:t>Penzenstadler</a:t>
+            </a:r>
+            <a:r>
+              <a:rPr lang="en-US" dirty="0"/>
+              <a:t>, B. (2015). Artefact-based requirements engineering: the </a:t>
+            </a:r>
+            <a:r>
+              <a:rPr lang="en-US" dirty="0" err="1"/>
+              <a:t>AMDiRE</a:t>
+            </a:r>
+            <a:r>
+              <a:rPr lang="en-US" dirty="0"/>
+              <a:t> approach. Requirements Engineering, 20, 405-434.</a:t>
+            </a:r>
+          </a:p>
+          <a:p>
+            <a:r>
+              <a:rPr lang="en-US" dirty="0"/>
+              <a:t>[4] Fernández, D. M., Wagner, S., Kalinowski, M., </a:t>
+            </a:r>
+            <a:r>
+              <a:rPr lang="en-US" dirty="0" err="1"/>
+              <a:t>Felderer</a:t>
+            </a:r>
+            <a:r>
+              <a:rPr lang="en-US" dirty="0"/>
+              <a:t>, M., </a:t>
+            </a:r>
+            <a:r>
+              <a:rPr lang="en-US" dirty="0" err="1"/>
+              <a:t>Mafra</a:t>
+            </a:r>
+            <a:r>
+              <a:rPr lang="en-US" dirty="0"/>
+              <a:t>, P., </a:t>
+            </a:r>
+            <a:r>
+              <a:rPr lang="en-US" dirty="0" err="1"/>
+              <a:t>Vetrò</a:t>
+            </a:r>
+            <a:r>
+              <a:rPr lang="en-US" dirty="0"/>
+              <a:t>, A., ... &amp; </a:t>
+            </a:r>
+            <a:r>
+              <a:rPr lang="en-US" dirty="0" err="1"/>
+              <a:t>Wieringa</a:t>
+            </a:r>
+            <a:r>
+              <a:rPr lang="en-US" dirty="0"/>
+              <a:t>, R. (2017). Naming the pain in requirements engineering: Contemporary problems, causes, and effects in practice. </a:t>
+            </a:r>
+            <a:r>
+              <a:rPr lang="en-US" i="1" dirty="0"/>
+              <a:t>Empirical software engineering</a:t>
+            </a:r>
+            <a:r>
+              <a:rPr lang="en-US" dirty="0"/>
+              <a:t>, </a:t>
+            </a:r>
+            <a:r>
+              <a:rPr lang="en-US" i="1" dirty="0"/>
+              <a:t>22</a:t>
+            </a:r>
+            <a:r>
+              <a:rPr lang="en-US" dirty="0"/>
+              <a:t>, 2298-2338.</a:t>
+            </a:r>
+          </a:p>
+          <a:p>
+            <a:r>
+              <a:rPr lang="en-US" dirty="0"/>
+              <a:t>[5] Boehm, B. W. (1984). Software engineering economics. </a:t>
+            </a:r>
+            <a:r>
+              <a:rPr lang="en-US" i="1" dirty="0"/>
+              <a:t>IEEE transactions on Software Engineering</a:t>
+            </a:r>
+            <a:r>
+              <a:rPr lang="en-US" dirty="0"/>
+              <a:t>, (1), 4-21.</a:t>
+            </a:r>
+          </a:p>
+        </p:txBody>
+      </p:sp>
+      <p:sp>
+        <p:nvSpPr>
+          <p:cNvPr id="4" name="Date Placeholder 3">
+            <a:extLst>
+              <a:ext uri="{FF2B5EF4-FFF2-40B4-BE49-F238E27FC236}">
+                <a16:creationId xmlns:a16="http://schemas.microsoft.com/office/drawing/2014/main" id="{4B530D44-DF2F-34D7-E1B0-125778A85D45}"/>
+              </a:ext>
+            </a:extLst>
+          </p:cNvPr>
+          <p:cNvSpPr>
+            <a:spLocks noGrp="1"/>
+          </p:cNvSpPr>
+          <p:nvPr>
+            <p:ph type="dt" sz="half" idx="2"/>
+          </p:nvPr>
+        </p:nvSpPr>
+        <p:spPr/>
+        <p:txBody>
+          <a:bodyPr/>
+          <a:lstStyle/>
+          <a:p>
+            <a:fld id="{6E36FCD1-EF0D-414A-8715-FDA5010CE504}" type="datetime1">
+              <a:rPr lang="en-US" smtClean="0"/>
+              <a:t>1/25/2024</a:t>
+            </a:fld>
+            <a:endParaRPr lang="en-US"/>
+          </a:p>
+        </p:txBody>
+      </p:sp>
+      <p:sp>
+        <p:nvSpPr>
+          <p:cNvPr id="5" name="Slide Number Placeholder 4">
+            <a:extLst>
+              <a:ext uri="{FF2B5EF4-FFF2-40B4-BE49-F238E27FC236}">
+                <a16:creationId xmlns:a16="http://schemas.microsoft.com/office/drawing/2014/main" id="{EE6978DF-9668-0C32-9243-F51A20DBE326}"/>
+              </a:ext>
+            </a:extLst>
+          </p:cNvPr>
+          <p:cNvSpPr>
+            <a:spLocks noGrp="1"/>
+          </p:cNvSpPr>
+          <p:nvPr>
+            <p:ph type="sldNum" sz="quarter" idx="4"/>
+          </p:nvPr>
+        </p:nvSpPr>
+        <p:spPr/>
+        <p:txBody>
+          <a:bodyPr/>
+          <a:lstStyle/>
+          <a:p>
+            <a:fld id="{C46382A4-AB59-4CCC-9EC0-E60A0AF9AA08}" type="slidenum">
+              <a:rPr lang="en-US" smtClean="0"/>
+              <a:t>43</a:t>
+            </a:fld>
+            <a:endParaRPr lang="en-US"/>
+          </a:p>
+        </p:txBody>
+      </p:sp>
+    </p:spTree>
+    <p:extLst>
+      <p:ext uri="{BB962C8B-B14F-4D97-AF65-F5344CB8AC3E}">
+        <p14:creationId xmlns:p14="http://schemas.microsoft.com/office/powerpoint/2010/main" val="919754077"/>
+      </p:ext>
+    </p:extLst>
+  </p:cSld>
+  <p:clrMapOvr>
+    <a:masterClrMapping/>
+  </p:clrMapOvr>
+  <p:transition spd="slow">
+    <p:push/>
+  </p:transition>
+</p:sld>
+</file>
+
+<file path=ppt/slides/slide44.xml><?xml version="1.0" encoding="utf-8"?>
+<p:sld xmlns:a="http://schemas.openxmlformats.org/drawingml/2006/main" xmlns:r="http://schemas.openxmlformats.org/officeDocument/2006/relationships" xmlns:p="http://schemas.openxmlformats.org/presentationml/2006/main">
+  <p:cSld>
+    <p:spTree>
+      <p:nvGrpSpPr>
+        <p:cNvPr id="1" name=""/>
+        <p:cNvGrpSpPr/>
+        <p:nvPr/>
+      </p:nvGrpSpPr>
+      <p:grpSpPr>
+        <a:xfrm>
+          <a:off x="0" y="0"/>
+          <a:ext cx="0" cy="0"/>
+          <a:chOff x="0" y="0"/>
+          <a:chExt cx="0" cy="0"/>
+        </a:xfrm>
+      </p:grpSpPr>
     </p:spTree>
     <p:extLst>
       <p:ext uri="{BB962C8B-B14F-4D97-AF65-F5344CB8AC3E}">
@@ -48849,7 +49280,7 @@
           <a:p>
             <a:fld id="{3C98D75D-F6F6-4D22-AF56-15C2601F62BE}" type="datetime1">
               <a:rPr lang="en-US" smtClean="0"/>
-              <a:t>1/22/2024</a:t>
+              <a:t>1/25/2024</a:t>
             </a:fld>
             <a:endParaRPr lang="en-US"/>
           </a:p>
@@ -48977,7 +49408,7 @@
           <a:p>
             <a:fld id="{4A6BE51D-594A-4AF1-BC92-380271B10B71}" type="datetime1">
               <a:rPr lang="en-US" smtClean="0"/>
-              <a:t>1/22/2024</a:t>
+              <a:t>1/25/2024</a:t>
             </a:fld>
             <a:endParaRPr lang="en-US" dirty="0"/>
           </a:p>
@@ -50262,7 +50693,7 @@
           <a:p>
             <a:fld id="{6362E252-A31E-4446-9B00-CAE6C0E4DD61}" type="datetime1">
               <a:rPr lang="en-US" smtClean="0"/>
-              <a:t>1/22/2024</a:t>
+              <a:t>1/25/2024</a:t>
             </a:fld>
             <a:endParaRPr lang="en-US"/>
           </a:p>
@@ -50447,6 +50878,41 @@
                 </a:solidFill>
               </a:rPr>
               <a:t>: The system shall be secure and comply to data privacy guidelines</a:t>
+            </a:r>
+          </a:p>
+        </p:txBody>
+      </p:sp>
+      <p:sp>
+        <p:nvSpPr>
+          <p:cNvPr id="8" name="TextBox 7">
+            <a:extLst>
+              <a:ext uri="{FF2B5EF4-FFF2-40B4-BE49-F238E27FC236}">
+                <a16:creationId xmlns:a16="http://schemas.microsoft.com/office/drawing/2014/main" id="{72895B62-90CC-9CC7-2974-F15EB4F67FC4}"/>
+              </a:ext>
+            </a:extLst>
+          </p:cNvPr>
+          <p:cNvSpPr txBox="1"/>
+          <p:nvPr/>
+        </p:nvSpPr>
+        <p:spPr>
+          <a:xfrm>
+            <a:off x="838199" y="6110129"/>
+            <a:ext cx="4682383" cy="246221"/>
+          </a:xfrm>
+          <a:prstGeom prst="rect">
+            <a:avLst/>
+          </a:prstGeom>
+          <a:noFill/>
+        </p:spPr>
+        <p:txBody>
+          <a:bodyPr wrap="square" rtlCol="0">
+            <a:spAutoFit/>
+          </a:bodyPr>
+          <a:lstStyle/>
+          <a:p>
+            <a:r>
+              <a:rPr lang="en-US" sz="1000" dirty="0"/>
+              <a:t>Adapted from [1] and [2]</a:t>
             </a:r>
           </a:p>
         </p:txBody>
@@ -50690,7 +51156,7 @@
           <a:p>
             <a:fld id="{258C5EBA-ADFE-4783-B297-F49D6491EA2E}" type="datetime1">
               <a:rPr lang="en-US" smtClean="0"/>
-              <a:t>1/22/2024</a:t>
+              <a:t>1/25/2024</a:t>
             </a:fld>
             <a:endParaRPr lang="en-US"/>
           </a:p>
@@ -50722,6 +51188,41 @@
               <a:t>8</a:t>
             </a:fld>
             <a:endParaRPr lang="en-US"/>
+          </a:p>
+        </p:txBody>
+      </p:sp>
+      <p:sp>
+        <p:nvSpPr>
+          <p:cNvPr id="6" name="TextBox 5">
+            <a:extLst>
+              <a:ext uri="{FF2B5EF4-FFF2-40B4-BE49-F238E27FC236}">
+                <a16:creationId xmlns:a16="http://schemas.microsoft.com/office/drawing/2014/main" id="{D7CECE4D-8FDB-7CC9-F01F-58BDAAA64095}"/>
+              </a:ext>
+            </a:extLst>
+          </p:cNvPr>
+          <p:cNvSpPr txBox="1"/>
+          <p:nvPr/>
+        </p:nvSpPr>
+        <p:spPr>
+          <a:xfrm>
+            <a:off x="838199" y="6110129"/>
+            <a:ext cx="4682383" cy="246221"/>
+          </a:xfrm>
+          <a:prstGeom prst="rect">
+            <a:avLst/>
+          </a:prstGeom>
+          <a:noFill/>
+        </p:spPr>
+        <p:txBody>
+          <a:bodyPr wrap="square" rtlCol="0">
+            <a:spAutoFit/>
+          </a:bodyPr>
+          <a:lstStyle/>
+          <a:p>
+            <a:r>
+              <a:rPr lang="en-US" sz="1000" dirty="0"/>
+              <a:t>Based on [1]</a:t>
+            </a:r>
           </a:p>
         </p:txBody>
       </p:sp>
@@ -50851,7 +51352,7 @@
           <a:p>
             <a:fld id="{E0C939B5-519B-4A24-A142-A97D58E28E0C}" type="datetime1">
               <a:rPr lang="en-US" smtClean="0"/>
-              <a:t>1/22/2024</a:t>
+              <a:t>1/25/2024</a:t>
             </a:fld>
             <a:endParaRPr lang="en-US"/>
           </a:p>

</xml_diff>